<commit_message>
paper completed but not the model..
</commit_message>
<xml_diff>
--- a/figures/figures.pptx
+++ b/figures/figures.pptx
@@ -8,6 +8,8 @@
     <p:sldId id="256" r:id="rId2"/>
     <p:sldId id="257" r:id="rId3"/>
     <p:sldId id="258" r:id="rId4"/>
+    <p:sldId id="259" r:id="rId5"/>
+    <p:sldId id="260" r:id="rId6"/>
   </p:sldIdLst>
   <p:sldSz cx="12192000" cy="6858000"/>
   <p:notesSz cx="6858000" cy="9144000"/>
@@ -106,6 +108,11 @@
       </a:defRPr>
     </a:lvl9pPr>
   </p:defaultTextStyle>
+  <p:extLst>
+    <p:ext uri="{EFAFB233-063F-42B5-8137-9DF3F51BA10A}">
+      <p15:sldGuideLst xmlns:p15="http://schemas.microsoft.com/office/powerpoint/2012/main"/>
+    </p:ext>
+  </p:extLst>
 </p:presentation>
 </file>
 
@@ -240,7 +247,7 @@
           <a:p>
             <a:fld id="{D82108EC-0443-494A-9EED-0B83C08DD7A9}" type="datetimeFigureOut">
               <a:rPr lang="ko-KR" altLang="en-US" smtClean="0"/>
-              <a:t>2024-12-10</a:t>
+              <a:t>2024-12-13</a:t>
             </a:fld>
             <a:endParaRPr lang="ko-KR" altLang="en-US"/>
           </a:p>
@@ -410,7 +417,7 @@
           <a:p>
             <a:fld id="{D82108EC-0443-494A-9EED-0B83C08DD7A9}" type="datetimeFigureOut">
               <a:rPr lang="ko-KR" altLang="en-US" smtClean="0"/>
-              <a:t>2024-12-10</a:t>
+              <a:t>2024-12-13</a:t>
             </a:fld>
             <a:endParaRPr lang="ko-KR" altLang="en-US"/>
           </a:p>
@@ -590,7 +597,7 @@
           <a:p>
             <a:fld id="{D82108EC-0443-494A-9EED-0B83C08DD7A9}" type="datetimeFigureOut">
               <a:rPr lang="ko-KR" altLang="en-US" smtClean="0"/>
-              <a:t>2024-12-10</a:t>
+              <a:t>2024-12-13</a:t>
             </a:fld>
             <a:endParaRPr lang="ko-KR" altLang="en-US"/>
           </a:p>
@@ -760,7 +767,7 @@
           <a:p>
             <a:fld id="{D82108EC-0443-494A-9EED-0B83C08DD7A9}" type="datetimeFigureOut">
               <a:rPr lang="ko-KR" altLang="en-US" smtClean="0"/>
-              <a:t>2024-12-10</a:t>
+              <a:t>2024-12-13</a:t>
             </a:fld>
             <a:endParaRPr lang="ko-KR" altLang="en-US"/>
           </a:p>
@@ -1006,7 +1013,7 @@
           <a:p>
             <a:fld id="{D82108EC-0443-494A-9EED-0B83C08DD7A9}" type="datetimeFigureOut">
               <a:rPr lang="ko-KR" altLang="en-US" smtClean="0"/>
-              <a:t>2024-12-10</a:t>
+              <a:t>2024-12-13</a:t>
             </a:fld>
             <a:endParaRPr lang="ko-KR" altLang="en-US"/>
           </a:p>
@@ -1238,7 +1245,7 @@
           <a:p>
             <a:fld id="{D82108EC-0443-494A-9EED-0B83C08DD7A9}" type="datetimeFigureOut">
               <a:rPr lang="ko-KR" altLang="en-US" smtClean="0"/>
-              <a:t>2024-12-10</a:t>
+              <a:t>2024-12-13</a:t>
             </a:fld>
             <a:endParaRPr lang="ko-KR" altLang="en-US"/>
           </a:p>
@@ -1605,7 +1612,7 @@
           <a:p>
             <a:fld id="{D82108EC-0443-494A-9EED-0B83C08DD7A9}" type="datetimeFigureOut">
               <a:rPr lang="ko-KR" altLang="en-US" smtClean="0"/>
-              <a:t>2024-12-10</a:t>
+              <a:t>2024-12-13</a:t>
             </a:fld>
             <a:endParaRPr lang="ko-KR" altLang="en-US"/>
           </a:p>
@@ -1723,7 +1730,7 @@
           <a:p>
             <a:fld id="{D82108EC-0443-494A-9EED-0B83C08DD7A9}" type="datetimeFigureOut">
               <a:rPr lang="ko-KR" altLang="en-US" smtClean="0"/>
-              <a:t>2024-12-10</a:t>
+              <a:t>2024-12-13</a:t>
             </a:fld>
             <a:endParaRPr lang="ko-KR" altLang="en-US"/>
           </a:p>
@@ -1818,7 +1825,7 @@
           <a:p>
             <a:fld id="{D82108EC-0443-494A-9EED-0B83C08DD7A9}" type="datetimeFigureOut">
               <a:rPr lang="ko-KR" altLang="en-US" smtClean="0"/>
-              <a:t>2024-12-10</a:t>
+              <a:t>2024-12-13</a:t>
             </a:fld>
             <a:endParaRPr lang="ko-KR" altLang="en-US"/>
           </a:p>
@@ -2095,7 +2102,7 @@
           <a:p>
             <a:fld id="{D82108EC-0443-494A-9EED-0B83C08DD7A9}" type="datetimeFigureOut">
               <a:rPr lang="ko-KR" altLang="en-US" smtClean="0"/>
-              <a:t>2024-12-10</a:t>
+              <a:t>2024-12-13</a:t>
             </a:fld>
             <a:endParaRPr lang="ko-KR" altLang="en-US"/>
           </a:p>
@@ -2348,7 +2355,7 @@
           <a:p>
             <a:fld id="{D82108EC-0443-494A-9EED-0B83C08DD7A9}" type="datetimeFigureOut">
               <a:rPr lang="ko-KR" altLang="en-US" smtClean="0"/>
-              <a:t>2024-12-10</a:t>
+              <a:t>2024-12-13</a:t>
             </a:fld>
             <a:endParaRPr lang="ko-KR" altLang="en-US"/>
           </a:p>
@@ -2561,7 +2568,7 @@
           <a:p>
             <a:fld id="{D82108EC-0443-494A-9EED-0B83C08DD7A9}" type="datetimeFigureOut">
               <a:rPr lang="ko-KR" altLang="en-US" smtClean="0"/>
-              <a:t>2024-12-10</a:t>
+              <a:t>2024-12-13</a:t>
             </a:fld>
             <a:endParaRPr lang="ko-KR" altLang="en-US"/>
           </a:p>
@@ -3026,8 +3033,8 @@
           </a:prstGeom>
         </p:spPr>
       </p:pic>
-      <mc:AlternateContent xmlns:mc="http://schemas.openxmlformats.org/markup-compatibility/2006">
-        <mc:Choice xmlns:a14="http://schemas.microsoft.com/office/drawing/2010/main" Requires="a14">
+      <mc:AlternateContent xmlns:mc="http://schemas.openxmlformats.org/markup-compatibility/2006" xmlns:a14="http://schemas.microsoft.com/office/drawing/2010/main">
+        <mc:Choice Requires="a14">
           <p:sp>
             <p:nvSpPr>
               <p:cNvPr id="7" name="직사각형 6"/>
@@ -3104,7 +3111,7 @@
             </p:txBody>
           </p:sp>
         </mc:Choice>
-        <mc:Fallback>
+        <mc:Fallback xmlns="">
           <p:sp>
             <p:nvSpPr>
               <p:cNvPr id="7" name="직사각형 6"/>
@@ -3143,8 +3150,8 @@
           </p:sp>
         </mc:Fallback>
       </mc:AlternateContent>
-      <mc:AlternateContent xmlns:mc="http://schemas.openxmlformats.org/markup-compatibility/2006">
-        <mc:Choice xmlns:a14="http://schemas.microsoft.com/office/drawing/2010/main" Requires="a14">
+      <mc:AlternateContent xmlns:mc="http://schemas.openxmlformats.org/markup-compatibility/2006" xmlns:a14="http://schemas.microsoft.com/office/drawing/2010/main">
+        <mc:Choice Requires="a14">
           <p:sp>
             <p:nvSpPr>
               <p:cNvPr id="8" name="직사각형 7"/>
@@ -3221,7 +3228,7 @@
             </p:txBody>
           </p:sp>
         </mc:Choice>
-        <mc:Fallback>
+        <mc:Fallback xmlns="">
           <p:sp>
             <p:nvSpPr>
               <p:cNvPr id="8" name="직사각형 7"/>
@@ -3597,8 +3604,8 @@
             </a:fontRef>
           </p:style>
         </p:cxnSp>
-        <mc:AlternateContent xmlns:mc="http://schemas.openxmlformats.org/markup-compatibility/2006">
-          <mc:Choice xmlns:a14="http://schemas.microsoft.com/office/drawing/2010/main" Requires="a14">
+        <mc:AlternateContent xmlns:mc="http://schemas.openxmlformats.org/markup-compatibility/2006" xmlns:a14="http://schemas.microsoft.com/office/drawing/2010/main">
+          <mc:Choice Requires="a14">
             <p:sp>
               <p:nvSpPr>
                 <p:cNvPr id="14" name="직사각형 13"/>
@@ -3686,7 +3693,7 @@
               </p:txBody>
             </p:sp>
           </mc:Choice>
-          <mc:Fallback>
+          <mc:Fallback xmlns="">
             <p:sp>
               <p:nvSpPr>
                 <p:cNvPr id="14" name="직사각형 13"/>
@@ -3725,8 +3732,8 @@
             </p:sp>
           </mc:Fallback>
         </mc:AlternateContent>
-        <mc:AlternateContent xmlns:mc="http://schemas.openxmlformats.org/markup-compatibility/2006">
-          <mc:Choice xmlns:a14="http://schemas.microsoft.com/office/drawing/2010/main" Requires="a14">
+        <mc:AlternateContent xmlns:mc="http://schemas.openxmlformats.org/markup-compatibility/2006" xmlns:a14="http://schemas.microsoft.com/office/drawing/2010/main">
+          <mc:Choice Requires="a14">
             <p:sp>
               <p:nvSpPr>
                 <p:cNvPr id="15" name="직사각형 14"/>
@@ -3781,7 +3788,7 @@
               </p:txBody>
             </p:sp>
           </mc:Choice>
-          <mc:Fallback>
+          <mc:Fallback xmlns="">
             <p:sp>
               <p:nvSpPr>
                 <p:cNvPr id="15" name="직사각형 14"/>
@@ -3820,8 +3827,8 @@
             </p:sp>
           </mc:Fallback>
         </mc:AlternateContent>
-        <mc:AlternateContent xmlns:mc="http://schemas.openxmlformats.org/markup-compatibility/2006">
-          <mc:Choice xmlns:a14="http://schemas.microsoft.com/office/drawing/2010/main" Requires="a14">
+        <mc:AlternateContent xmlns:mc="http://schemas.openxmlformats.org/markup-compatibility/2006" xmlns:a14="http://schemas.microsoft.com/office/drawing/2010/main">
+          <mc:Choice Requires="a14">
             <p:sp>
               <p:nvSpPr>
                 <p:cNvPr id="16" name="직사각형 15"/>
@@ -3876,7 +3883,7 @@
               </p:txBody>
             </p:sp>
           </mc:Choice>
-          <mc:Fallback>
+          <mc:Fallback xmlns="">
             <p:sp>
               <p:nvSpPr>
                 <p:cNvPr id="16" name="직사각형 15"/>
@@ -3915,8 +3922,8 @@
             </p:sp>
           </mc:Fallback>
         </mc:AlternateContent>
-        <mc:AlternateContent xmlns:mc="http://schemas.openxmlformats.org/markup-compatibility/2006">
-          <mc:Choice xmlns:a14="http://schemas.microsoft.com/office/drawing/2010/main" Requires="a14">
+        <mc:AlternateContent xmlns:mc="http://schemas.openxmlformats.org/markup-compatibility/2006" xmlns:a14="http://schemas.microsoft.com/office/drawing/2010/main">
+          <mc:Choice Requires="a14">
             <p:sp>
               <p:nvSpPr>
                 <p:cNvPr id="17" name="직사각형 16"/>
@@ -3971,7 +3978,7 @@
               </p:txBody>
             </p:sp>
           </mc:Choice>
-          <mc:Fallback>
+          <mc:Fallback xmlns="">
             <p:sp>
               <p:nvSpPr>
                 <p:cNvPr id="17" name="직사각형 16"/>
@@ -4010,8 +4017,8 @@
             </p:sp>
           </mc:Fallback>
         </mc:AlternateContent>
-        <mc:AlternateContent xmlns:mc="http://schemas.openxmlformats.org/markup-compatibility/2006">
-          <mc:Choice xmlns:a14="http://schemas.microsoft.com/office/drawing/2010/main" Requires="a14">
+        <mc:AlternateContent xmlns:mc="http://schemas.openxmlformats.org/markup-compatibility/2006" xmlns:a14="http://schemas.microsoft.com/office/drawing/2010/main">
+          <mc:Choice Requires="a14">
             <p:sp>
               <p:nvSpPr>
                 <p:cNvPr id="18" name="직사각형 17"/>
@@ -4066,7 +4073,7 @@
               </p:txBody>
             </p:sp>
           </mc:Choice>
-          <mc:Fallback>
+          <mc:Fallback xmlns="">
             <p:sp>
               <p:nvSpPr>
                 <p:cNvPr id="18" name="직사각형 17"/>
@@ -4105,8 +4112,8 @@
             </p:sp>
           </mc:Fallback>
         </mc:AlternateContent>
-        <mc:AlternateContent xmlns:mc="http://schemas.openxmlformats.org/markup-compatibility/2006">
-          <mc:Choice xmlns:a14="http://schemas.microsoft.com/office/drawing/2010/main" Requires="a14">
+        <mc:AlternateContent xmlns:mc="http://schemas.openxmlformats.org/markup-compatibility/2006" xmlns:a14="http://schemas.microsoft.com/office/drawing/2010/main">
+          <mc:Choice Requires="a14">
             <p:sp>
               <p:nvSpPr>
                 <p:cNvPr id="19" name="직사각형 18"/>
@@ -4183,7 +4190,7 @@
               </p:txBody>
             </p:sp>
           </mc:Choice>
-          <mc:Fallback>
+          <mc:Fallback xmlns="">
             <p:sp>
               <p:nvSpPr>
                 <p:cNvPr id="19" name="직사각형 18"/>
@@ -4222,8 +4229,8 @@
             </p:sp>
           </mc:Fallback>
         </mc:AlternateContent>
-        <mc:AlternateContent xmlns:mc="http://schemas.openxmlformats.org/markup-compatibility/2006">
-          <mc:Choice xmlns:a14="http://schemas.microsoft.com/office/drawing/2010/main" Requires="a14">
+        <mc:AlternateContent xmlns:mc="http://schemas.openxmlformats.org/markup-compatibility/2006" xmlns:a14="http://schemas.microsoft.com/office/drawing/2010/main">
+          <mc:Choice Requires="a14">
             <p:sp>
               <p:nvSpPr>
                 <p:cNvPr id="20" name="직사각형 19"/>
@@ -4278,7 +4285,7 @@
               </p:txBody>
             </p:sp>
           </mc:Choice>
-          <mc:Fallback>
+          <mc:Fallback xmlns="">
             <p:sp>
               <p:nvSpPr>
                 <p:cNvPr id="20" name="직사각형 19"/>
@@ -4737,8 +4744,8 @@
           </a:fontRef>
         </p:style>
       </p:cxnSp>
-      <mc:AlternateContent xmlns:mc="http://schemas.openxmlformats.org/markup-compatibility/2006">
-        <mc:Choice xmlns:a14="http://schemas.microsoft.com/office/drawing/2010/main" Requires="a14">
+      <mc:AlternateContent xmlns:mc="http://schemas.openxmlformats.org/markup-compatibility/2006" xmlns:a14="http://schemas.microsoft.com/office/drawing/2010/main">
+        <mc:Choice Requires="a14">
           <p:sp>
             <p:nvSpPr>
               <p:cNvPr id="31" name="직사각형 30"/>
@@ -4793,7 +4800,7 @@
             </p:txBody>
           </p:sp>
         </mc:Choice>
-        <mc:Fallback>
+        <mc:Fallback xmlns="">
           <p:sp>
             <p:nvSpPr>
               <p:cNvPr id="31" name="직사각형 30"/>
@@ -4832,8 +4839,8 @@
           </p:sp>
         </mc:Fallback>
       </mc:AlternateContent>
-      <mc:AlternateContent xmlns:mc="http://schemas.openxmlformats.org/markup-compatibility/2006">
-        <mc:Choice xmlns:a14="http://schemas.microsoft.com/office/drawing/2010/main" Requires="a14">
+      <mc:AlternateContent xmlns:mc="http://schemas.openxmlformats.org/markup-compatibility/2006" xmlns:a14="http://schemas.microsoft.com/office/drawing/2010/main">
+        <mc:Choice Requires="a14">
           <p:sp>
             <p:nvSpPr>
               <p:cNvPr id="32" name="직사각형 31"/>
@@ -4910,7 +4917,7 @@
             </p:txBody>
           </p:sp>
         </mc:Choice>
-        <mc:Fallback>
+        <mc:Fallback xmlns="">
           <p:sp>
             <p:nvSpPr>
               <p:cNvPr id="32" name="직사각형 31"/>
@@ -4987,8 +4994,8 @@
           </a:fontRef>
         </p:style>
       </p:cxnSp>
-      <mc:AlternateContent xmlns:mc="http://schemas.openxmlformats.org/markup-compatibility/2006">
-        <mc:Choice xmlns:a14="http://schemas.microsoft.com/office/drawing/2010/main" Requires="a14">
+      <mc:AlternateContent xmlns:mc="http://schemas.openxmlformats.org/markup-compatibility/2006" xmlns:a14="http://schemas.microsoft.com/office/drawing/2010/main">
+        <mc:Choice Requires="a14">
           <p:sp>
             <p:nvSpPr>
               <p:cNvPr id="40" name="직사각형 39"/>
@@ -5044,7 +5051,7 @@
             </p:txBody>
           </p:sp>
         </mc:Choice>
-        <mc:Fallback>
+        <mc:Fallback xmlns="">
           <p:sp>
             <p:nvSpPr>
               <p:cNvPr id="40" name="직사각형 39"/>
@@ -5130,8 +5137,8 @@
           </a:p>
         </p:txBody>
       </p:sp>
-      <mc:AlternateContent xmlns:mc="http://schemas.openxmlformats.org/markup-compatibility/2006">
-        <mc:Choice xmlns:a14="http://schemas.microsoft.com/office/drawing/2010/main" Requires="a14">
+      <mc:AlternateContent xmlns:mc="http://schemas.openxmlformats.org/markup-compatibility/2006" xmlns:a14="http://schemas.microsoft.com/office/drawing/2010/main">
+        <mc:Choice Requires="a14">
           <p:sp>
             <p:nvSpPr>
               <p:cNvPr id="44" name="직사각형 43"/>
@@ -5211,7 +5218,7 @@
             </p:txBody>
           </p:sp>
         </mc:Choice>
-        <mc:Fallback>
+        <mc:Fallback xmlns="">
           <p:sp>
             <p:nvSpPr>
               <p:cNvPr id="44" name="직사각형 43"/>
@@ -5250,8 +5257,8 @@
           </p:sp>
         </mc:Fallback>
       </mc:AlternateContent>
-      <mc:AlternateContent xmlns:mc="http://schemas.openxmlformats.org/markup-compatibility/2006">
-        <mc:Choice xmlns:a14="http://schemas.microsoft.com/office/drawing/2010/main" Requires="a14">
+      <mc:AlternateContent xmlns:mc="http://schemas.openxmlformats.org/markup-compatibility/2006" xmlns:a14="http://schemas.microsoft.com/office/drawing/2010/main">
+        <mc:Choice Requires="a14">
           <p:sp>
             <p:nvSpPr>
               <p:cNvPr id="45" name="직사각형 44"/>
@@ -5338,7 +5345,7 @@
             </p:txBody>
           </p:sp>
         </mc:Choice>
-        <mc:Fallback>
+        <mc:Fallback xmlns="">
           <p:sp>
             <p:nvSpPr>
               <p:cNvPr id="45" name="직사각형 44"/>
@@ -5377,8 +5384,8 @@
           </p:sp>
         </mc:Fallback>
       </mc:AlternateContent>
-      <mc:AlternateContent xmlns:mc="http://schemas.openxmlformats.org/markup-compatibility/2006">
-        <mc:Choice xmlns:a14="http://schemas.microsoft.com/office/drawing/2010/main" Requires="a14">
+      <mc:AlternateContent xmlns:mc="http://schemas.openxmlformats.org/markup-compatibility/2006" xmlns:a14="http://schemas.microsoft.com/office/drawing/2010/main">
+        <mc:Choice Requires="a14">
           <p:sp>
             <p:nvSpPr>
               <p:cNvPr id="46" name="직사각형 45"/>
@@ -5465,7 +5472,7 @@
             </p:txBody>
           </p:sp>
         </mc:Choice>
-        <mc:Fallback>
+        <mc:Fallback xmlns="">
           <p:sp>
             <p:nvSpPr>
               <p:cNvPr id="46" name="직사각형 45"/>
@@ -5504,8 +5511,8 @@
           </p:sp>
         </mc:Fallback>
       </mc:AlternateContent>
-      <mc:AlternateContent xmlns:mc="http://schemas.openxmlformats.org/markup-compatibility/2006">
-        <mc:Choice xmlns:a14="http://schemas.microsoft.com/office/drawing/2010/main" Requires="a14">
+      <mc:AlternateContent xmlns:mc="http://schemas.openxmlformats.org/markup-compatibility/2006" xmlns:a14="http://schemas.microsoft.com/office/drawing/2010/main">
+        <mc:Choice Requires="a14">
           <p:sp>
             <p:nvSpPr>
               <p:cNvPr id="47" name="직사각형 46"/>
@@ -5576,7 +5583,7 @@
             </p:txBody>
           </p:sp>
         </mc:Choice>
-        <mc:Fallback>
+        <mc:Fallback xmlns="">
           <p:sp>
             <p:nvSpPr>
               <p:cNvPr id="47" name="직사각형 46"/>
@@ -5705,8 +5712,8 @@
           </a:p>
         </p:txBody>
       </p:sp>
-      <mc:AlternateContent xmlns:mc="http://schemas.openxmlformats.org/markup-compatibility/2006">
-        <mc:Choice xmlns:a14="http://schemas.microsoft.com/office/drawing/2010/main" Requires="a14">
+      <mc:AlternateContent xmlns:mc="http://schemas.openxmlformats.org/markup-compatibility/2006" xmlns:a14="http://schemas.microsoft.com/office/drawing/2010/main">
+        <mc:Choice Requires="a14">
           <p:sp>
             <p:nvSpPr>
               <p:cNvPr id="50" name="직사각형 49"/>
@@ -5800,7 +5807,7 @@
             </p:txBody>
           </p:sp>
         </mc:Choice>
-        <mc:Fallback>
+        <mc:Fallback xmlns="">
           <p:sp>
             <p:nvSpPr>
               <p:cNvPr id="50" name="직사각형 49"/>
@@ -5936,8 +5943,8 @@
           </a:p>
         </p:txBody>
       </p:sp>
-      <mc:AlternateContent xmlns:mc="http://schemas.openxmlformats.org/markup-compatibility/2006">
-        <mc:Choice xmlns:a14="http://schemas.microsoft.com/office/drawing/2010/main" Requires="a14">
+      <mc:AlternateContent xmlns:mc="http://schemas.openxmlformats.org/markup-compatibility/2006" xmlns:a14="http://schemas.microsoft.com/office/drawing/2010/main">
+        <mc:Choice Requires="a14">
           <p:sp>
             <p:nvSpPr>
               <p:cNvPr id="53" name="직사각형 52"/>
@@ -5992,7 +5999,7 @@
             </p:txBody>
           </p:sp>
         </mc:Choice>
-        <mc:Fallback>
+        <mc:Fallback xmlns="">
           <p:sp>
             <p:nvSpPr>
               <p:cNvPr id="53" name="직사각형 52"/>
@@ -6159,8 +6166,8 @@
           </a:fontRef>
         </p:style>
       </p:cxnSp>
-      <mc:AlternateContent xmlns:mc="http://schemas.openxmlformats.org/markup-compatibility/2006">
-        <mc:Choice xmlns:a14="http://schemas.microsoft.com/office/drawing/2010/main" Requires="a14">
+      <mc:AlternateContent xmlns:mc="http://schemas.openxmlformats.org/markup-compatibility/2006" xmlns:a14="http://schemas.microsoft.com/office/drawing/2010/main">
+        <mc:Choice Requires="a14">
           <p:sp>
             <p:nvSpPr>
               <p:cNvPr id="69" name="직사각형 68"/>
@@ -6231,7 +6238,7 @@
             </p:txBody>
           </p:sp>
         </mc:Choice>
-        <mc:Fallback>
+        <mc:Fallback xmlns="">
           <p:sp>
             <p:nvSpPr>
               <p:cNvPr id="69" name="직사각형 68"/>
@@ -6270,8 +6277,8 @@
           </p:sp>
         </mc:Fallback>
       </mc:AlternateContent>
-      <mc:AlternateContent xmlns:mc="http://schemas.openxmlformats.org/markup-compatibility/2006">
-        <mc:Choice xmlns:a14="http://schemas.microsoft.com/office/drawing/2010/main" Requires="a14">
+      <mc:AlternateContent xmlns:mc="http://schemas.openxmlformats.org/markup-compatibility/2006" xmlns:a14="http://schemas.microsoft.com/office/drawing/2010/main">
+        <mc:Choice Requires="a14">
           <p:sp>
             <p:nvSpPr>
               <p:cNvPr id="70" name="직사각형 69"/>
@@ -6342,7 +6349,7 @@
             </p:txBody>
           </p:sp>
         </mc:Choice>
-        <mc:Fallback>
+        <mc:Fallback xmlns="">
           <p:sp>
             <p:nvSpPr>
               <p:cNvPr id="70" name="직사각형 69"/>
@@ -6639,8 +6646,8 @@
           </a:fontRef>
         </p:style>
       </p:cxnSp>
-      <mc:AlternateContent xmlns:mc="http://schemas.openxmlformats.org/markup-compatibility/2006">
-        <mc:Choice xmlns:a14="http://schemas.microsoft.com/office/drawing/2010/main" Requires="a14">
+      <mc:AlternateContent xmlns:mc="http://schemas.openxmlformats.org/markup-compatibility/2006" xmlns:a14="http://schemas.microsoft.com/office/drawing/2010/main">
+        <mc:Choice Requires="a14">
           <p:sp>
             <p:nvSpPr>
               <p:cNvPr id="85" name="직사각형 84"/>
@@ -6711,7 +6718,7 @@
             </p:txBody>
           </p:sp>
         </mc:Choice>
-        <mc:Fallback>
+        <mc:Fallback xmlns="">
           <p:sp>
             <p:nvSpPr>
               <p:cNvPr id="85" name="직사각형 84"/>
@@ -7187,8 +7194,8 @@
           </a:fontRef>
         </p:style>
       </p:cxnSp>
-      <mc:AlternateContent xmlns:mc="http://schemas.openxmlformats.org/markup-compatibility/2006">
-        <mc:Choice xmlns:a14="http://schemas.microsoft.com/office/drawing/2010/main" Requires="a14">
+      <mc:AlternateContent xmlns:mc="http://schemas.openxmlformats.org/markup-compatibility/2006" xmlns:a14="http://schemas.microsoft.com/office/drawing/2010/main">
+        <mc:Choice Requires="a14">
           <p:sp>
             <p:nvSpPr>
               <p:cNvPr id="93" name="직사각형 92"/>
@@ -7243,7 +7250,7 @@
             </p:txBody>
           </p:sp>
         </mc:Choice>
-        <mc:Fallback>
+        <mc:Fallback xmlns="">
           <p:sp>
             <p:nvSpPr>
               <p:cNvPr id="93" name="직사각형 92"/>
@@ -7282,8 +7289,8 @@
           </p:sp>
         </mc:Fallback>
       </mc:AlternateContent>
-      <mc:AlternateContent xmlns:mc="http://schemas.openxmlformats.org/markup-compatibility/2006">
-        <mc:Choice xmlns:a14="http://schemas.microsoft.com/office/drawing/2010/main" Requires="a14">
+      <mc:AlternateContent xmlns:mc="http://schemas.openxmlformats.org/markup-compatibility/2006" xmlns:a14="http://schemas.microsoft.com/office/drawing/2010/main">
+        <mc:Choice Requires="a14">
           <p:sp>
             <p:nvSpPr>
               <p:cNvPr id="94" name="직사각형 93"/>
@@ -7360,7 +7367,7 @@
             </p:txBody>
           </p:sp>
         </mc:Choice>
-        <mc:Fallback>
+        <mc:Fallback xmlns="">
           <p:sp>
             <p:nvSpPr>
               <p:cNvPr id="94" name="직사각형 93"/>
@@ -7437,8 +7444,8 @@
           </a:fontRef>
         </p:style>
       </p:cxnSp>
-      <mc:AlternateContent xmlns:mc="http://schemas.openxmlformats.org/markup-compatibility/2006">
-        <mc:Choice xmlns:a14="http://schemas.microsoft.com/office/drawing/2010/main" Requires="a14">
+      <mc:AlternateContent xmlns:mc="http://schemas.openxmlformats.org/markup-compatibility/2006" xmlns:a14="http://schemas.microsoft.com/office/drawing/2010/main">
+        <mc:Choice Requires="a14">
           <p:sp>
             <p:nvSpPr>
               <p:cNvPr id="96" name="직사각형 95"/>
@@ -7494,7 +7501,7 @@
             </p:txBody>
           </p:sp>
         </mc:Choice>
-        <mc:Fallback>
+        <mc:Fallback xmlns="">
           <p:sp>
             <p:nvSpPr>
               <p:cNvPr id="96" name="직사각형 95"/>
@@ -7580,8 +7587,8 @@
           </a:p>
         </p:txBody>
       </p:sp>
-      <mc:AlternateContent xmlns:mc="http://schemas.openxmlformats.org/markup-compatibility/2006">
-        <mc:Choice xmlns:a14="http://schemas.microsoft.com/office/drawing/2010/main" Requires="a14">
+      <mc:AlternateContent xmlns:mc="http://schemas.openxmlformats.org/markup-compatibility/2006" xmlns:a14="http://schemas.microsoft.com/office/drawing/2010/main">
+        <mc:Choice Requires="a14">
           <p:sp>
             <p:nvSpPr>
               <p:cNvPr id="98" name="직사각형 97"/>
@@ -7661,7 +7668,7 @@
             </p:txBody>
           </p:sp>
         </mc:Choice>
-        <mc:Fallback>
+        <mc:Fallback xmlns="">
           <p:sp>
             <p:nvSpPr>
               <p:cNvPr id="98" name="직사각형 97"/>
@@ -7700,8 +7707,8 @@
           </p:sp>
         </mc:Fallback>
       </mc:AlternateContent>
-      <mc:AlternateContent xmlns:mc="http://schemas.openxmlformats.org/markup-compatibility/2006">
-        <mc:Choice xmlns:a14="http://schemas.microsoft.com/office/drawing/2010/main" Requires="a14">
+      <mc:AlternateContent xmlns:mc="http://schemas.openxmlformats.org/markup-compatibility/2006" xmlns:a14="http://schemas.microsoft.com/office/drawing/2010/main">
+        <mc:Choice Requires="a14">
           <p:sp>
             <p:nvSpPr>
               <p:cNvPr id="99" name="직사각형 98"/>
@@ -7788,7 +7795,7 @@
             </p:txBody>
           </p:sp>
         </mc:Choice>
-        <mc:Fallback>
+        <mc:Fallback xmlns="">
           <p:sp>
             <p:nvSpPr>
               <p:cNvPr id="99" name="직사각형 98"/>
@@ -7827,8 +7834,8 @@
           </p:sp>
         </mc:Fallback>
       </mc:AlternateContent>
-      <mc:AlternateContent xmlns:mc="http://schemas.openxmlformats.org/markup-compatibility/2006">
-        <mc:Choice xmlns:a14="http://schemas.microsoft.com/office/drawing/2010/main" Requires="a14">
+      <mc:AlternateContent xmlns:mc="http://schemas.openxmlformats.org/markup-compatibility/2006" xmlns:a14="http://schemas.microsoft.com/office/drawing/2010/main">
+        <mc:Choice Requires="a14">
           <p:sp>
             <p:nvSpPr>
               <p:cNvPr id="100" name="직사각형 99"/>
@@ -7915,7 +7922,7 @@
             </p:txBody>
           </p:sp>
         </mc:Choice>
-        <mc:Fallback>
+        <mc:Fallback xmlns="">
           <p:sp>
             <p:nvSpPr>
               <p:cNvPr id="100" name="직사각형 99"/>
@@ -7954,8 +7961,8 @@
           </p:sp>
         </mc:Fallback>
       </mc:AlternateContent>
-      <mc:AlternateContent xmlns:mc="http://schemas.openxmlformats.org/markup-compatibility/2006">
-        <mc:Choice xmlns:a14="http://schemas.microsoft.com/office/drawing/2010/main" Requires="a14">
+      <mc:AlternateContent xmlns:mc="http://schemas.openxmlformats.org/markup-compatibility/2006" xmlns:a14="http://schemas.microsoft.com/office/drawing/2010/main">
+        <mc:Choice Requires="a14">
           <p:sp>
             <p:nvSpPr>
               <p:cNvPr id="101" name="직사각형 100"/>
@@ -8026,7 +8033,7 @@
             </p:txBody>
           </p:sp>
         </mc:Choice>
-        <mc:Fallback>
+        <mc:Fallback xmlns="">
           <p:sp>
             <p:nvSpPr>
               <p:cNvPr id="101" name="직사각형 100"/>
@@ -8155,8 +8162,8 @@
           </a:p>
         </p:txBody>
       </p:sp>
-      <mc:AlternateContent xmlns:mc="http://schemas.openxmlformats.org/markup-compatibility/2006">
-        <mc:Choice xmlns:a14="http://schemas.microsoft.com/office/drawing/2010/main" Requires="a14">
+      <mc:AlternateContent xmlns:mc="http://schemas.openxmlformats.org/markup-compatibility/2006" xmlns:a14="http://schemas.microsoft.com/office/drawing/2010/main">
+        <mc:Choice Requires="a14">
           <p:sp>
             <p:nvSpPr>
               <p:cNvPr id="104" name="직사각형 103"/>
@@ -8259,7 +8266,7 @@
             </p:txBody>
           </p:sp>
         </mc:Choice>
-        <mc:Fallback>
+        <mc:Fallback xmlns="">
           <p:sp>
             <p:nvSpPr>
               <p:cNvPr id="104" name="직사각형 103"/>
@@ -8395,8 +8402,8 @@
           </a:p>
         </p:txBody>
       </p:sp>
-      <mc:AlternateContent xmlns:mc="http://schemas.openxmlformats.org/markup-compatibility/2006">
-        <mc:Choice xmlns:a14="http://schemas.microsoft.com/office/drawing/2010/main" Requires="a14">
+      <mc:AlternateContent xmlns:mc="http://schemas.openxmlformats.org/markup-compatibility/2006" xmlns:a14="http://schemas.microsoft.com/office/drawing/2010/main">
+        <mc:Choice Requires="a14">
           <p:sp>
             <p:nvSpPr>
               <p:cNvPr id="107" name="직사각형 106"/>
@@ -8451,7 +8458,7 @@
             </p:txBody>
           </p:sp>
         </mc:Choice>
-        <mc:Fallback>
+        <mc:Fallback xmlns="">
           <p:sp>
             <p:nvSpPr>
               <p:cNvPr id="107" name="직사각형 106"/>
@@ -8619,8 +8626,8 @@
           </a:fontRef>
         </p:style>
       </p:cxnSp>
-      <mc:AlternateContent xmlns:mc="http://schemas.openxmlformats.org/markup-compatibility/2006">
-        <mc:Choice xmlns:a14="http://schemas.microsoft.com/office/drawing/2010/main" Requires="a14">
+      <mc:AlternateContent xmlns:mc="http://schemas.openxmlformats.org/markup-compatibility/2006" xmlns:a14="http://schemas.microsoft.com/office/drawing/2010/main">
+        <mc:Choice Requires="a14">
           <p:sp>
             <p:nvSpPr>
               <p:cNvPr id="111" name="직사각형 110"/>
@@ -8691,7 +8698,7 @@
             </p:txBody>
           </p:sp>
         </mc:Choice>
-        <mc:Fallback>
+        <mc:Fallback xmlns="">
           <p:sp>
             <p:nvSpPr>
               <p:cNvPr id="111" name="직사각형 110"/>
@@ -8730,8 +8737,8 @@
           </p:sp>
         </mc:Fallback>
       </mc:AlternateContent>
-      <mc:AlternateContent xmlns:mc="http://schemas.openxmlformats.org/markup-compatibility/2006">
-        <mc:Choice xmlns:a14="http://schemas.microsoft.com/office/drawing/2010/main" Requires="a14">
+      <mc:AlternateContent xmlns:mc="http://schemas.openxmlformats.org/markup-compatibility/2006" xmlns:a14="http://schemas.microsoft.com/office/drawing/2010/main">
+        <mc:Choice Requires="a14">
           <p:sp>
             <p:nvSpPr>
               <p:cNvPr id="112" name="직사각형 111"/>
@@ -8802,7 +8809,7 @@
             </p:txBody>
           </p:sp>
         </mc:Choice>
-        <mc:Fallback>
+        <mc:Fallback xmlns="">
           <p:sp>
             <p:nvSpPr>
               <p:cNvPr id="112" name="직사각형 111"/>
@@ -9099,8 +9106,8 @@
           </a:fontRef>
         </p:style>
       </p:cxnSp>
-      <mc:AlternateContent xmlns:mc="http://schemas.openxmlformats.org/markup-compatibility/2006">
-        <mc:Choice xmlns:a14="http://schemas.microsoft.com/office/drawing/2010/main" Requires="a14">
+      <mc:AlternateContent xmlns:mc="http://schemas.openxmlformats.org/markup-compatibility/2006" xmlns:a14="http://schemas.microsoft.com/office/drawing/2010/main">
+        <mc:Choice Requires="a14">
           <p:sp>
             <p:nvSpPr>
               <p:cNvPr id="119" name="직사각형 118"/>
@@ -9171,7 +9178,7 @@
             </p:txBody>
           </p:sp>
         </mc:Choice>
-        <mc:Fallback>
+        <mc:Fallback xmlns="">
           <p:sp>
             <p:nvSpPr>
               <p:cNvPr id="119" name="직사각형 118"/>
@@ -9342,6 +9349,1284 @@
     <p:extLst>
       <p:ext uri="{BB962C8B-B14F-4D97-AF65-F5344CB8AC3E}">
         <p14:creationId xmlns:p14="http://schemas.microsoft.com/office/powerpoint/2010/main" val="4057482450"/>
+      </p:ext>
+    </p:extLst>
+  </p:cSld>
+  <p:clrMapOvr>
+    <a:masterClrMapping/>
+  </p:clrMapOvr>
+</p:sld>
+</file>
+
+<file path=ppt/slides/slide4.xml><?xml version="1.0" encoding="utf-8"?>
+<p:sld xmlns:a="http://schemas.openxmlformats.org/drawingml/2006/main" xmlns:r="http://schemas.openxmlformats.org/officeDocument/2006/relationships" xmlns:p="http://schemas.openxmlformats.org/presentationml/2006/main">
+  <p:cSld>
+    <p:spTree>
+      <p:nvGrpSpPr>
+        <p:cNvPr id="1" name=""/>
+        <p:cNvGrpSpPr/>
+        <p:nvPr/>
+      </p:nvGrpSpPr>
+      <p:grpSpPr>
+        <a:xfrm>
+          <a:off x="0" y="0"/>
+          <a:ext cx="0" cy="0"/>
+          <a:chOff x="0" y="0"/>
+          <a:chExt cx="0" cy="0"/>
+        </a:xfrm>
+      </p:grpSpPr>
+      <p:pic>
+        <p:nvPicPr>
+          <p:cNvPr id="2" name="그림 1"/>
+          <p:cNvPicPr>
+            <a:picLocks noChangeAspect="1"/>
+          </p:cNvPicPr>
+          <p:nvPr/>
+        </p:nvPicPr>
+        <p:blipFill>
+          <a:blip r:embed="rId2">
+            <a:extLst>
+              <a:ext uri="{28A0092B-C50C-407E-A947-70E740481C1C}">
+                <a14:useLocalDpi xmlns:a14="http://schemas.microsoft.com/office/drawing/2010/main" val="0"/>
+              </a:ext>
+            </a:extLst>
+          </a:blip>
+          <a:stretch>
+            <a:fillRect/>
+          </a:stretch>
+        </p:blipFill>
+        <p:spPr>
+          <a:xfrm>
+            <a:off x="1752925" y="696726"/>
+            <a:ext cx="4094792" cy="2252366"/>
+          </a:xfrm>
+          <a:prstGeom prst="rect">
+            <a:avLst/>
+          </a:prstGeom>
+        </p:spPr>
+      </p:pic>
+      <p:pic>
+        <p:nvPicPr>
+          <p:cNvPr id="7" name="그림 6"/>
+          <p:cNvPicPr>
+            <a:picLocks noChangeAspect="1"/>
+          </p:cNvPicPr>
+          <p:nvPr/>
+        </p:nvPicPr>
+        <p:blipFill>
+          <a:blip r:embed="rId3">
+            <a:extLst>
+              <a:ext uri="{28A0092B-C50C-407E-A947-70E740481C1C}">
+                <a14:useLocalDpi xmlns:a14="http://schemas.microsoft.com/office/drawing/2010/main" val="0"/>
+              </a:ext>
+            </a:extLst>
+          </a:blip>
+          <a:stretch>
+            <a:fillRect/>
+          </a:stretch>
+        </p:blipFill>
+        <p:spPr>
+          <a:xfrm>
+            <a:off x="6345198" y="696725"/>
+            <a:ext cx="4086433" cy="2252365"/>
+          </a:xfrm>
+          <a:prstGeom prst="rect">
+            <a:avLst/>
+          </a:prstGeom>
+        </p:spPr>
+      </p:pic>
+      <mc:AlternateContent xmlns:mc="http://schemas.openxmlformats.org/markup-compatibility/2006">
+        <mc:Choice xmlns:a14="http://schemas.microsoft.com/office/drawing/2010/main" Requires="a14">
+          <p:sp>
+            <p:nvSpPr>
+              <p:cNvPr id="74" name="직사각형 73"/>
+              <p:cNvSpPr/>
+              <p:nvPr/>
+            </p:nvSpPr>
+            <p:spPr>
+              <a:xfrm>
+                <a:off x="1442457" y="660720"/>
+                <a:ext cx="498406" cy="307777"/>
+              </a:xfrm>
+              <a:prstGeom prst="rect">
+                <a:avLst/>
+              </a:prstGeom>
+              <a:noFill/>
+            </p:spPr>
+            <p:txBody>
+              <a:bodyPr wrap="none" lIns="91440" tIns="45720" rIns="91440" bIns="45720">
+                <a:spAutoFit/>
+              </a:bodyPr>
+              <a:lstStyle/>
+              <a:p>
+                <a:pPr algn="ctr"/>
+                <a14:m>
+                  <m:oMathPara xmlns:m="http://schemas.openxmlformats.org/officeDocument/2006/math">
+                    <m:oMathParaPr>
+                      <m:jc m:val="centerGroup"/>
+                    </m:oMathParaPr>
+                    <m:oMath xmlns:m="http://schemas.openxmlformats.org/officeDocument/2006/math">
+                      <m:r>
+                        <a:rPr lang="en-US" altLang="ko-KR" sz="1400" b="0" i="1" cap="none" spc="0" smtClean="0">
+                          <a:ln w="0"/>
+                          <a:solidFill>
+                            <a:schemeClr val="tx1"/>
+                          </a:solidFill>
+                          <a:effectLst/>
+                          <a:latin typeface="Cambria Math" panose="02040503050406030204" pitchFamily="18" charset="0"/>
+                        </a:rPr>
+                        <m:t>(</m:t>
+                      </m:r>
+                      <m:r>
+                        <a:rPr lang="en-US" altLang="ko-KR" sz="1400" b="0" i="1" cap="none" spc="0" smtClean="0">
+                          <a:ln w="0"/>
+                          <a:solidFill>
+                            <a:schemeClr val="tx1"/>
+                          </a:solidFill>
+                          <a:effectLst/>
+                          <a:latin typeface="Cambria Math" panose="02040503050406030204" pitchFamily="18" charset="0"/>
+                        </a:rPr>
+                        <m:t>𝑎</m:t>
+                      </m:r>
+                      <m:r>
+                        <a:rPr lang="en-US" altLang="ko-KR" sz="1400" b="0" i="1" cap="none" spc="0" smtClean="0">
+                          <a:ln w="0"/>
+                          <a:solidFill>
+                            <a:schemeClr val="tx1"/>
+                          </a:solidFill>
+                          <a:effectLst/>
+                          <a:latin typeface="Cambria Math" panose="02040503050406030204" pitchFamily="18" charset="0"/>
+                        </a:rPr>
+                        <m:t>)</m:t>
+                      </m:r>
+                    </m:oMath>
+                  </m:oMathPara>
+                </a14:m>
+                <a:endParaRPr lang="en-US" altLang="ko-KR" sz="1400" b="0" cap="none" spc="0">
+                  <a:ln w="0"/>
+                  <a:solidFill>
+                    <a:schemeClr val="tx1"/>
+                  </a:solidFill>
+                  <a:effectLst/>
+                </a:endParaRPr>
+              </a:p>
+            </p:txBody>
+          </p:sp>
+        </mc:Choice>
+        <mc:Fallback>
+          <p:sp>
+            <p:nvSpPr>
+              <p:cNvPr id="74" name="직사각형 73"/>
+              <p:cNvSpPr>
+                <a:spLocks noRot="1" noChangeAspect="1" noMove="1" noResize="1" noEditPoints="1" noAdjustHandles="1" noChangeArrowheads="1" noChangeShapeType="1" noTextEdit="1"/>
+              </p:cNvSpPr>
+              <p:nvPr/>
+            </p:nvSpPr>
+            <p:spPr>
+              <a:xfrm>
+                <a:off x="1442457" y="660720"/>
+                <a:ext cx="498406" cy="307777"/>
+              </a:xfrm>
+              <a:prstGeom prst="rect">
+                <a:avLst/>
+              </a:prstGeom>
+              <a:blipFill>
+                <a:blip r:embed="rId4"/>
+                <a:stretch>
+                  <a:fillRect b="-9804"/>
+                </a:stretch>
+              </a:blipFill>
+            </p:spPr>
+            <p:txBody>
+              <a:bodyPr/>
+              <a:lstStyle/>
+              <a:p>
+                <a:r>
+                  <a:rPr lang="ko-KR" altLang="en-US">
+                    <a:noFill/>
+                  </a:rPr>
+                  <a:t> </a:t>
+                </a:r>
+              </a:p>
+            </p:txBody>
+          </p:sp>
+        </mc:Fallback>
+      </mc:AlternateContent>
+      <mc:AlternateContent xmlns:mc="http://schemas.openxmlformats.org/markup-compatibility/2006">
+        <mc:Choice xmlns:a14="http://schemas.microsoft.com/office/drawing/2010/main" Requires="a14">
+          <p:sp>
+            <p:nvSpPr>
+              <p:cNvPr id="76" name="직사각형 75"/>
+              <p:cNvSpPr/>
+              <p:nvPr/>
+            </p:nvSpPr>
+            <p:spPr>
+              <a:xfrm>
+                <a:off x="6020395" y="660719"/>
+                <a:ext cx="494815" cy="307777"/>
+              </a:xfrm>
+              <a:prstGeom prst="rect">
+                <a:avLst/>
+              </a:prstGeom>
+              <a:noFill/>
+            </p:spPr>
+            <p:txBody>
+              <a:bodyPr wrap="none" lIns="91440" tIns="45720" rIns="91440" bIns="45720">
+                <a:spAutoFit/>
+              </a:bodyPr>
+              <a:lstStyle/>
+              <a:p>
+                <a:pPr algn="ctr"/>
+                <a14:m>
+                  <m:oMathPara xmlns:m="http://schemas.openxmlformats.org/officeDocument/2006/math">
+                    <m:oMathParaPr>
+                      <m:jc m:val="centerGroup"/>
+                    </m:oMathParaPr>
+                    <m:oMath xmlns:m="http://schemas.openxmlformats.org/officeDocument/2006/math">
+                      <m:r>
+                        <a:rPr lang="en-US" altLang="ko-KR" sz="1400" b="0" i="1" cap="none" spc="0" smtClean="0">
+                          <a:ln w="0"/>
+                          <a:solidFill>
+                            <a:schemeClr val="tx1"/>
+                          </a:solidFill>
+                          <a:effectLst/>
+                          <a:latin typeface="Cambria Math" panose="02040503050406030204" pitchFamily="18" charset="0"/>
+                        </a:rPr>
+                        <m:t>(</m:t>
+                      </m:r>
+                      <m:r>
+                        <a:rPr lang="en-US" altLang="ko-KR" sz="1400" b="0" i="1" cap="none" spc="0" smtClean="0">
+                          <a:ln w="0"/>
+                          <a:solidFill>
+                            <a:schemeClr val="tx1"/>
+                          </a:solidFill>
+                          <a:effectLst/>
+                          <a:latin typeface="Cambria Math" panose="02040503050406030204" pitchFamily="18" charset="0"/>
+                        </a:rPr>
+                        <m:t>𝑏</m:t>
+                      </m:r>
+                      <m:r>
+                        <a:rPr lang="en-US" altLang="ko-KR" sz="1400" b="0" i="1" cap="none" spc="0" smtClean="0">
+                          <a:ln w="0"/>
+                          <a:solidFill>
+                            <a:schemeClr val="tx1"/>
+                          </a:solidFill>
+                          <a:effectLst/>
+                          <a:latin typeface="Cambria Math" panose="02040503050406030204" pitchFamily="18" charset="0"/>
+                        </a:rPr>
+                        <m:t>)</m:t>
+                      </m:r>
+                    </m:oMath>
+                  </m:oMathPara>
+                </a14:m>
+                <a:endParaRPr lang="en-US" altLang="ko-KR" sz="1400" b="0" cap="none" spc="0">
+                  <a:ln w="0"/>
+                  <a:solidFill>
+                    <a:schemeClr val="tx1"/>
+                  </a:solidFill>
+                  <a:effectLst/>
+                </a:endParaRPr>
+              </a:p>
+            </p:txBody>
+          </p:sp>
+        </mc:Choice>
+        <mc:Fallback>
+          <p:sp>
+            <p:nvSpPr>
+              <p:cNvPr id="76" name="직사각형 75"/>
+              <p:cNvSpPr>
+                <a:spLocks noRot="1" noChangeAspect="1" noMove="1" noResize="1" noEditPoints="1" noAdjustHandles="1" noChangeArrowheads="1" noChangeShapeType="1" noTextEdit="1"/>
+              </p:cNvSpPr>
+              <p:nvPr/>
+            </p:nvSpPr>
+            <p:spPr>
+              <a:xfrm>
+                <a:off x="6020395" y="660719"/>
+                <a:ext cx="494815" cy="307777"/>
+              </a:xfrm>
+              <a:prstGeom prst="rect">
+                <a:avLst/>
+              </a:prstGeom>
+              <a:blipFill>
+                <a:blip r:embed="rId5"/>
+                <a:stretch>
+                  <a:fillRect b="-9804"/>
+                </a:stretch>
+              </a:blipFill>
+            </p:spPr>
+            <p:txBody>
+              <a:bodyPr/>
+              <a:lstStyle/>
+              <a:p>
+                <a:r>
+                  <a:rPr lang="ko-KR" altLang="en-US">
+                    <a:noFill/>
+                  </a:rPr>
+                  <a:t> </a:t>
+                </a:r>
+              </a:p>
+            </p:txBody>
+          </p:sp>
+        </mc:Fallback>
+      </mc:AlternateContent>
+    </p:spTree>
+    <p:extLst>
+      <p:ext uri="{BB962C8B-B14F-4D97-AF65-F5344CB8AC3E}">
+        <p14:creationId xmlns:p14="http://schemas.microsoft.com/office/powerpoint/2010/main" val="2572214214"/>
+      </p:ext>
+    </p:extLst>
+  </p:cSld>
+  <p:clrMapOvr>
+    <a:masterClrMapping/>
+  </p:clrMapOvr>
+</p:sld>
+</file>
+
+<file path=ppt/slides/slide5.xml><?xml version="1.0" encoding="utf-8"?>
+<p:sld xmlns:a="http://schemas.openxmlformats.org/drawingml/2006/main" xmlns:r="http://schemas.openxmlformats.org/officeDocument/2006/relationships" xmlns:p="http://schemas.openxmlformats.org/presentationml/2006/main">
+  <p:cSld>
+    <p:spTree>
+      <p:nvGrpSpPr>
+        <p:cNvPr id="1" name=""/>
+        <p:cNvGrpSpPr/>
+        <p:nvPr/>
+      </p:nvGrpSpPr>
+      <p:grpSpPr>
+        <a:xfrm>
+          <a:off x="0" y="0"/>
+          <a:ext cx="0" cy="0"/>
+          <a:chOff x="0" y="0"/>
+          <a:chExt cx="0" cy="0"/>
+        </a:xfrm>
+      </p:grpSpPr>
+      <p:pic>
+        <p:nvPicPr>
+          <p:cNvPr id="3" name="그림 2"/>
+          <p:cNvPicPr>
+            <a:picLocks noChangeAspect="1"/>
+          </p:cNvPicPr>
+          <p:nvPr/>
+        </p:nvPicPr>
+        <p:blipFill>
+          <a:blip r:embed="rId2" cstate="print">
+            <a:extLst>
+              <a:ext uri="{28A0092B-C50C-407E-A947-70E740481C1C}">
+                <a14:useLocalDpi xmlns:a14="http://schemas.microsoft.com/office/drawing/2010/main" val="0"/>
+              </a:ext>
+            </a:extLst>
+          </a:blip>
+          <a:stretch>
+            <a:fillRect/>
+          </a:stretch>
+        </p:blipFill>
+        <p:spPr>
+          <a:xfrm>
+            <a:off x="505968" y="738587"/>
+            <a:ext cx="5425440" cy="2394468"/>
+          </a:xfrm>
+          <a:prstGeom prst="rect">
+            <a:avLst/>
+          </a:prstGeom>
+        </p:spPr>
+      </p:pic>
+      <p:pic>
+        <p:nvPicPr>
+          <p:cNvPr id="4" name="그림 3"/>
+          <p:cNvPicPr>
+            <a:picLocks noChangeAspect="1"/>
+          </p:cNvPicPr>
+          <p:nvPr/>
+        </p:nvPicPr>
+        <p:blipFill>
+          <a:blip r:embed="rId3" cstate="print">
+            <a:extLst>
+              <a:ext uri="{28A0092B-C50C-407E-A947-70E740481C1C}">
+                <a14:useLocalDpi xmlns:a14="http://schemas.microsoft.com/office/drawing/2010/main" val="0"/>
+              </a:ext>
+            </a:extLst>
+          </a:blip>
+          <a:stretch>
+            <a:fillRect/>
+          </a:stretch>
+        </p:blipFill>
+        <p:spPr>
+          <a:xfrm>
+            <a:off x="6205728" y="738587"/>
+            <a:ext cx="5425440" cy="2394468"/>
+          </a:xfrm>
+          <a:prstGeom prst="rect">
+            <a:avLst/>
+          </a:prstGeom>
+        </p:spPr>
+      </p:pic>
+      <p:pic>
+        <p:nvPicPr>
+          <p:cNvPr id="5" name="그림 4"/>
+          <p:cNvPicPr>
+            <a:picLocks noChangeAspect="1"/>
+          </p:cNvPicPr>
+          <p:nvPr/>
+        </p:nvPicPr>
+        <p:blipFill>
+          <a:blip r:embed="rId4" cstate="print">
+            <a:extLst>
+              <a:ext uri="{28A0092B-C50C-407E-A947-70E740481C1C}">
+                <a14:useLocalDpi xmlns:a14="http://schemas.microsoft.com/office/drawing/2010/main" val="0"/>
+              </a:ext>
+            </a:extLst>
+          </a:blip>
+          <a:stretch>
+            <a:fillRect/>
+          </a:stretch>
+        </p:blipFill>
+        <p:spPr>
+          <a:xfrm>
+            <a:off x="505968" y="3338531"/>
+            <a:ext cx="5425440" cy="2394468"/>
+          </a:xfrm>
+          <a:prstGeom prst="rect">
+            <a:avLst/>
+          </a:prstGeom>
+        </p:spPr>
+      </p:pic>
+      <p:pic>
+        <p:nvPicPr>
+          <p:cNvPr id="6" name="그림 5"/>
+          <p:cNvPicPr>
+            <a:picLocks noChangeAspect="1"/>
+          </p:cNvPicPr>
+          <p:nvPr/>
+        </p:nvPicPr>
+        <p:blipFill>
+          <a:blip r:embed="rId5" cstate="print">
+            <a:extLst>
+              <a:ext uri="{28A0092B-C50C-407E-A947-70E740481C1C}">
+                <a14:useLocalDpi xmlns:a14="http://schemas.microsoft.com/office/drawing/2010/main" val="0"/>
+              </a:ext>
+            </a:extLst>
+          </a:blip>
+          <a:stretch>
+            <a:fillRect/>
+          </a:stretch>
+        </p:blipFill>
+        <p:spPr>
+          <a:xfrm>
+            <a:off x="6205728" y="3338531"/>
+            <a:ext cx="5425440" cy="2394468"/>
+          </a:xfrm>
+          <a:prstGeom prst="rect">
+            <a:avLst/>
+          </a:prstGeom>
+        </p:spPr>
+      </p:pic>
+      <p:sp>
+        <p:nvSpPr>
+          <p:cNvPr id="8" name="직사각형 7"/>
+          <p:cNvSpPr/>
+          <p:nvPr/>
+        </p:nvSpPr>
+        <p:spPr>
+          <a:xfrm>
+            <a:off x="2753360" y="670561"/>
+            <a:ext cx="970280" cy="157920"/>
+          </a:xfrm>
+          <a:prstGeom prst="rect">
+            <a:avLst/>
+          </a:prstGeom>
+          <a:solidFill>
+            <a:schemeClr val="bg1"/>
+          </a:solidFill>
+          <a:ln>
+            <a:noFill/>
+          </a:ln>
+        </p:spPr>
+        <p:style>
+          <a:lnRef idx="2">
+            <a:schemeClr val="accent1">
+              <a:shade val="50000"/>
+            </a:schemeClr>
+          </a:lnRef>
+          <a:fillRef idx="1">
+            <a:schemeClr val="accent1"/>
+          </a:fillRef>
+          <a:effectRef idx="0">
+            <a:schemeClr val="accent1"/>
+          </a:effectRef>
+          <a:fontRef idx="minor">
+            <a:schemeClr val="lt1"/>
+          </a:fontRef>
+        </p:style>
+        <p:txBody>
+          <a:bodyPr rtlCol="0" anchor="ctr"/>
+          <a:lstStyle/>
+          <a:p>
+            <a:pPr algn="ctr"/>
+            <a:endParaRPr lang="ko-KR" altLang="en-US"/>
+          </a:p>
+        </p:txBody>
+      </p:sp>
+      <p:sp>
+        <p:nvSpPr>
+          <p:cNvPr id="11" name="직사각형 10"/>
+          <p:cNvSpPr/>
+          <p:nvPr/>
+        </p:nvSpPr>
+        <p:spPr>
+          <a:xfrm>
+            <a:off x="8483600" y="670561"/>
+            <a:ext cx="949960" cy="152839"/>
+          </a:xfrm>
+          <a:prstGeom prst="rect">
+            <a:avLst/>
+          </a:prstGeom>
+          <a:solidFill>
+            <a:schemeClr val="bg1"/>
+          </a:solidFill>
+          <a:ln>
+            <a:noFill/>
+          </a:ln>
+        </p:spPr>
+        <p:style>
+          <a:lnRef idx="2">
+            <a:schemeClr val="accent1">
+              <a:shade val="50000"/>
+            </a:schemeClr>
+          </a:lnRef>
+          <a:fillRef idx="1">
+            <a:schemeClr val="accent1"/>
+          </a:fillRef>
+          <a:effectRef idx="0">
+            <a:schemeClr val="accent1"/>
+          </a:effectRef>
+          <a:fontRef idx="minor">
+            <a:schemeClr val="lt1"/>
+          </a:fontRef>
+        </p:style>
+        <p:txBody>
+          <a:bodyPr rtlCol="0" anchor="ctr"/>
+          <a:lstStyle/>
+          <a:p>
+            <a:pPr algn="ctr"/>
+            <a:endParaRPr lang="ko-KR" altLang="en-US"/>
+          </a:p>
+        </p:txBody>
+      </p:sp>
+      <p:sp>
+        <p:nvSpPr>
+          <p:cNvPr id="12" name="직사각형 11"/>
+          <p:cNvSpPr/>
+          <p:nvPr/>
+        </p:nvSpPr>
+        <p:spPr>
+          <a:xfrm>
+            <a:off x="2910840" y="3276601"/>
+            <a:ext cx="652780" cy="149460"/>
+          </a:xfrm>
+          <a:prstGeom prst="rect">
+            <a:avLst/>
+          </a:prstGeom>
+          <a:solidFill>
+            <a:schemeClr val="bg1"/>
+          </a:solidFill>
+          <a:ln>
+            <a:noFill/>
+          </a:ln>
+        </p:spPr>
+        <p:style>
+          <a:lnRef idx="2">
+            <a:schemeClr val="accent1">
+              <a:shade val="50000"/>
+            </a:schemeClr>
+          </a:lnRef>
+          <a:fillRef idx="1">
+            <a:schemeClr val="accent1"/>
+          </a:fillRef>
+          <a:effectRef idx="0">
+            <a:schemeClr val="accent1"/>
+          </a:effectRef>
+          <a:fontRef idx="minor">
+            <a:schemeClr val="lt1"/>
+          </a:fontRef>
+        </p:style>
+        <p:txBody>
+          <a:bodyPr rtlCol="0" anchor="ctr"/>
+          <a:lstStyle/>
+          <a:p>
+            <a:pPr algn="ctr"/>
+            <a:endParaRPr lang="ko-KR" altLang="en-US"/>
+          </a:p>
+        </p:txBody>
+      </p:sp>
+      <p:sp>
+        <p:nvSpPr>
+          <p:cNvPr id="13" name="직사각형 12"/>
+          <p:cNvSpPr/>
+          <p:nvPr/>
+        </p:nvSpPr>
+        <p:spPr>
+          <a:xfrm>
+            <a:off x="8669020" y="3338531"/>
+            <a:ext cx="604520" cy="87529"/>
+          </a:xfrm>
+          <a:prstGeom prst="rect">
+            <a:avLst/>
+          </a:prstGeom>
+          <a:solidFill>
+            <a:schemeClr val="bg1"/>
+          </a:solidFill>
+          <a:ln>
+            <a:noFill/>
+          </a:ln>
+        </p:spPr>
+        <p:style>
+          <a:lnRef idx="2">
+            <a:schemeClr val="accent1">
+              <a:shade val="50000"/>
+            </a:schemeClr>
+          </a:lnRef>
+          <a:fillRef idx="1">
+            <a:schemeClr val="accent1"/>
+          </a:fillRef>
+          <a:effectRef idx="0">
+            <a:schemeClr val="accent1"/>
+          </a:effectRef>
+          <a:fontRef idx="minor">
+            <a:schemeClr val="lt1"/>
+          </a:fontRef>
+        </p:style>
+        <p:txBody>
+          <a:bodyPr rtlCol="0" anchor="ctr"/>
+          <a:lstStyle/>
+          <a:p>
+            <a:pPr algn="ctr"/>
+            <a:endParaRPr lang="ko-KR" altLang="en-US"/>
+          </a:p>
+        </p:txBody>
+      </p:sp>
+      <mc:AlternateContent xmlns:mc="http://schemas.openxmlformats.org/markup-compatibility/2006">
+        <mc:Choice xmlns:a14="http://schemas.microsoft.com/office/drawing/2010/main" Requires="a14">
+          <p:sp>
+            <p:nvSpPr>
+              <p:cNvPr id="14" name="직사각형 13"/>
+              <p:cNvSpPr/>
+              <p:nvPr/>
+            </p:nvSpPr>
+            <p:spPr>
+              <a:xfrm>
+                <a:off x="231648" y="738588"/>
+                <a:ext cx="498406" cy="307777"/>
+              </a:xfrm>
+              <a:prstGeom prst="rect">
+                <a:avLst/>
+              </a:prstGeom>
+              <a:noFill/>
+            </p:spPr>
+            <p:txBody>
+              <a:bodyPr wrap="none" lIns="91440" tIns="45720" rIns="91440" bIns="45720">
+                <a:spAutoFit/>
+              </a:bodyPr>
+              <a:lstStyle/>
+              <a:p>
+                <a:pPr algn="ctr"/>
+                <a14:m>
+                  <m:oMathPara xmlns:m="http://schemas.openxmlformats.org/officeDocument/2006/math">
+                    <m:oMathParaPr>
+                      <m:jc m:val="centerGroup"/>
+                    </m:oMathParaPr>
+                    <m:oMath xmlns:m="http://schemas.openxmlformats.org/officeDocument/2006/math">
+                      <m:r>
+                        <a:rPr lang="en-US" altLang="ko-KR" sz="1400" b="0" i="1" cap="none" spc="0" smtClean="0">
+                          <a:ln w="0"/>
+                          <a:solidFill>
+                            <a:schemeClr val="tx1"/>
+                          </a:solidFill>
+                          <a:effectLst/>
+                          <a:latin typeface="Cambria Math" panose="02040503050406030204" pitchFamily="18" charset="0"/>
+                        </a:rPr>
+                        <m:t>(</m:t>
+                      </m:r>
+                      <m:r>
+                        <a:rPr lang="en-US" altLang="ko-KR" sz="1400" b="0" i="1" cap="none" spc="0" smtClean="0">
+                          <a:ln w="0"/>
+                          <a:solidFill>
+                            <a:schemeClr val="tx1"/>
+                          </a:solidFill>
+                          <a:effectLst/>
+                          <a:latin typeface="Cambria Math" panose="02040503050406030204" pitchFamily="18" charset="0"/>
+                        </a:rPr>
+                        <m:t>𝑎</m:t>
+                      </m:r>
+                      <m:r>
+                        <a:rPr lang="en-US" altLang="ko-KR" sz="1400" b="0" i="1" cap="none" spc="0" smtClean="0">
+                          <a:ln w="0"/>
+                          <a:solidFill>
+                            <a:schemeClr val="tx1"/>
+                          </a:solidFill>
+                          <a:effectLst/>
+                          <a:latin typeface="Cambria Math" panose="02040503050406030204" pitchFamily="18" charset="0"/>
+                        </a:rPr>
+                        <m:t>)</m:t>
+                      </m:r>
+                    </m:oMath>
+                  </m:oMathPara>
+                </a14:m>
+                <a:endParaRPr lang="en-US" altLang="ko-KR" sz="1400" b="0" cap="none" spc="0">
+                  <a:ln w="0"/>
+                  <a:solidFill>
+                    <a:schemeClr val="tx1"/>
+                  </a:solidFill>
+                  <a:effectLst/>
+                </a:endParaRPr>
+              </a:p>
+            </p:txBody>
+          </p:sp>
+        </mc:Choice>
+        <mc:Fallback>
+          <p:sp>
+            <p:nvSpPr>
+              <p:cNvPr id="14" name="직사각형 13"/>
+              <p:cNvSpPr>
+                <a:spLocks noRot="1" noChangeAspect="1" noMove="1" noResize="1" noEditPoints="1" noAdjustHandles="1" noChangeArrowheads="1" noChangeShapeType="1" noTextEdit="1"/>
+              </p:cNvSpPr>
+              <p:nvPr/>
+            </p:nvSpPr>
+            <p:spPr>
+              <a:xfrm>
+                <a:off x="231648" y="738588"/>
+                <a:ext cx="498406" cy="307777"/>
+              </a:xfrm>
+              <a:prstGeom prst="rect">
+                <a:avLst/>
+              </a:prstGeom>
+              <a:blipFill>
+                <a:blip r:embed="rId6"/>
+                <a:stretch>
+                  <a:fillRect b="-9804"/>
+                </a:stretch>
+              </a:blipFill>
+            </p:spPr>
+            <p:txBody>
+              <a:bodyPr/>
+              <a:lstStyle/>
+              <a:p>
+                <a:r>
+                  <a:rPr lang="ko-KR" altLang="en-US">
+                    <a:noFill/>
+                  </a:rPr>
+                  <a:t> </a:t>
+                </a:r>
+              </a:p>
+            </p:txBody>
+          </p:sp>
+        </mc:Fallback>
+      </mc:AlternateContent>
+      <mc:AlternateContent xmlns:mc="http://schemas.openxmlformats.org/markup-compatibility/2006">
+        <mc:Choice xmlns:a14="http://schemas.microsoft.com/office/drawing/2010/main" Requires="a14">
+          <p:sp>
+            <p:nvSpPr>
+              <p:cNvPr id="15" name="직사각형 14"/>
+              <p:cNvSpPr/>
+              <p:nvPr/>
+            </p:nvSpPr>
+            <p:spPr>
+              <a:xfrm>
+                <a:off x="5912531" y="738587"/>
+                <a:ext cx="494815" cy="307777"/>
+              </a:xfrm>
+              <a:prstGeom prst="rect">
+                <a:avLst/>
+              </a:prstGeom>
+              <a:noFill/>
+            </p:spPr>
+            <p:txBody>
+              <a:bodyPr wrap="none" lIns="91440" tIns="45720" rIns="91440" bIns="45720">
+                <a:spAutoFit/>
+              </a:bodyPr>
+              <a:lstStyle/>
+              <a:p>
+                <a:pPr algn="ctr"/>
+                <a14:m>
+                  <m:oMathPara xmlns:m="http://schemas.openxmlformats.org/officeDocument/2006/math">
+                    <m:oMathParaPr>
+                      <m:jc m:val="centerGroup"/>
+                    </m:oMathParaPr>
+                    <m:oMath xmlns:m="http://schemas.openxmlformats.org/officeDocument/2006/math">
+                      <m:r>
+                        <a:rPr lang="en-US" altLang="ko-KR" sz="1400" b="0" i="1" cap="none" spc="0" smtClean="0">
+                          <a:ln w="0"/>
+                          <a:solidFill>
+                            <a:schemeClr val="tx1"/>
+                          </a:solidFill>
+                          <a:effectLst/>
+                          <a:latin typeface="Cambria Math" panose="02040503050406030204" pitchFamily="18" charset="0"/>
+                        </a:rPr>
+                        <m:t>(</m:t>
+                      </m:r>
+                      <m:r>
+                        <a:rPr lang="en-US" altLang="ko-KR" sz="1400" b="0" i="1" cap="none" spc="0" smtClean="0">
+                          <a:ln w="0"/>
+                          <a:solidFill>
+                            <a:schemeClr val="tx1"/>
+                          </a:solidFill>
+                          <a:effectLst/>
+                          <a:latin typeface="Cambria Math" panose="02040503050406030204" pitchFamily="18" charset="0"/>
+                        </a:rPr>
+                        <m:t>𝑏</m:t>
+                      </m:r>
+                      <m:r>
+                        <a:rPr lang="en-US" altLang="ko-KR" sz="1400" b="0" i="1" cap="none" spc="0" smtClean="0">
+                          <a:ln w="0"/>
+                          <a:solidFill>
+                            <a:schemeClr val="tx1"/>
+                          </a:solidFill>
+                          <a:effectLst/>
+                          <a:latin typeface="Cambria Math" panose="02040503050406030204" pitchFamily="18" charset="0"/>
+                        </a:rPr>
+                        <m:t>)</m:t>
+                      </m:r>
+                    </m:oMath>
+                  </m:oMathPara>
+                </a14:m>
+                <a:endParaRPr lang="en-US" altLang="ko-KR" sz="1400" b="0" cap="none" spc="0">
+                  <a:ln w="0"/>
+                  <a:solidFill>
+                    <a:schemeClr val="tx1"/>
+                  </a:solidFill>
+                  <a:effectLst/>
+                </a:endParaRPr>
+              </a:p>
+            </p:txBody>
+          </p:sp>
+        </mc:Choice>
+        <mc:Fallback>
+          <p:sp>
+            <p:nvSpPr>
+              <p:cNvPr id="15" name="직사각형 14"/>
+              <p:cNvSpPr>
+                <a:spLocks noRot="1" noChangeAspect="1" noMove="1" noResize="1" noEditPoints="1" noAdjustHandles="1" noChangeArrowheads="1" noChangeShapeType="1" noTextEdit="1"/>
+              </p:cNvSpPr>
+              <p:nvPr/>
+            </p:nvSpPr>
+            <p:spPr>
+              <a:xfrm>
+                <a:off x="5912531" y="738587"/>
+                <a:ext cx="494815" cy="307777"/>
+              </a:xfrm>
+              <a:prstGeom prst="rect">
+                <a:avLst/>
+              </a:prstGeom>
+              <a:blipFill>
+                <a:blip r:embed="rId7"/>
+                <a:stretch>
+                  <a:fillRect b="-9804"/>
+                </a:stretch>
+              </a:blipFill>
+            </p:spPr>
+            <p:txBody>
+              <a:bodyPr/>
+              <a:lstStyle/>
+              <a:p>
+                <a:r>
+                  <a:rPr lang="ko-KR" altLang="en-US">
+                    <a:noFill/>
+                  </a:rPr>
+                  <a:t> </a:t>
+                </a:r>
+              </a:p>
+            </p:txBody>
+          </p:sp>
+        </mc:Fallback>
+      </mc:AlternateContent>
+      <mc:AlternateContent xmlns:mc="http://schemas.openxmlformats.org/markup-compatibility/2006">
+        <mc:Choice xmlns:a14="http://schemas.microsoft.com/office/drawing/2010/main" Requires="a14">
+          <p:sp>
+            <p:nvSpPr>
+              <p:cNvPr id="17" name="직사각형 16"/>
+              <p:cNvSpPr/>
+              <p:nvPr/>
+            </p:nvSpPr>
+            <p:spPr>
+              <a:xfrm>
+                <a:off x="238990" y="3346328"/>
+                <a:ext cx="483722" cy="307777"/>
+              </a:xfrm>
+              <a:prstGeom prst="rect">
+                <a:avLst/>
+              </a:prstGeom>
+              <a:noFill/>
+            </p:spPr>
+            <p:txBody>
+              <a:bodyPr wrap="none" lIns="91440" tIns="45720" rIns="91440" bIns="45720">
+                <a:spAutoFit/>
+              </a:bodyPr>
+              <a:lstStyle/>
+              <a:p>
+                <a:pPr algn="ctr"/>
+                <a14:m>
+                  <m:oMathPara xmlns:m="http://schemas.openxmlformats.org/officeDocument/2006/math">
+                    <m:oMathParaPr>
+                      <m:jc m:val="centerGroup"/>
+                    </m:oMathParaPr>
+                    <m:oMath xmlns:m="http://schemas.openxmlformats.org/officeDocument/2006/math">
+                      <m:r>
+                        <a:rPr lang="en-US" altLang="ko-KR" sz="1400" b="0" i="1" cap="none" spc="0" smtClean="0">
+                          <a:ln w="0"/>
+                          <a:solidFill>
+                            <a:schemeClr val="tx1"/>
+                          </a:solidFill>
+                          <a:effectLst/>
+                          <a:latin typeface="Cambria Math" panose="02040503050406030204" pitchFamily="18" charset="0"/>
+                        </a:rPr>
+                        <m:t>(</m:t>
+                      </m:r>
+                      <m:r>
+                        <a:rPr lang="en-US" altLang="ko-KR" sz="1400" b="0" i="1" cap="none" spc="0" smtClean="0">
+                          <a:ln w="0"/>
+                          <a:solidFill>
+                            <a:schemeClr val="tx1"/>
+                          </a:solidFill>
+                          <a:effectLst/>
+                          <a:latin typeface="Cambria Math" panose="02040503050406030204" pitchFamily="18" charset="0"/>
+                        </a:rPr>
+                        <m:t>𝑐</m:t>
+                      </m:r>
+                      <m:r>
+                        <a:rPr lang="en-US" altLang="ko-KR" sz="1400" b="0" i="1" cap="none" spc="0" smtClean="0">
+                          <a:ln w="0"/>
+                          <a:solidFill>
+                            <a:schemeClr val="tx1"/>
+                          </a:solidFill>
+                          <a:effectLst/>
+                          <a:latin typeface="Cambria Math" panose="02040503050406030204" pitchFamily="18" charset="0"/>
+                        </a:rPr>
+                        <m:t>)</m:t>
+                      </m:r>
+                    </m:oMath>
+                  </m:oMathPara>
+                </a14:m>
+                <a:endParaRPr lang="en-US" altLang="ko-KR" sz="1400" b="0" cap="none" spc="0">
+                  <a:ln w="0"/>
+                  <a:solidFill>
+                    <a:schemeClr val="tx1"/>
+                  </a:solidFill>
+                  <a:effectLst/>
+                </a:endParaRPr>
+              </a:p>
+            </p:txBody>
+          </p:sp>
+        </mc:Choice>
+        <mc:Fallback>
+          <p:sp>
+            <p:nvSpPr>
+              <p:cNvPr id="17" name="직사각형 16"/>
+              <p:cNvSpPr>
+                <a:spLocks noRot="1" noChangeAspect="1" noMove="1" noResize="1" noEditPoints="1" noAdjustHandles="1" noChangeArrowheads="1" noChangeShapeType="1" noTextEdit="1"/>
+              </p:cNvSpPr>
+              <p:nvPr/>
+            </p:nvSpPr>
+            <p:spPr>
+              <a:xfrm>
+                <a:off x="238990" y="3346328"/>
+                <a:ext cx="483722" cy="307777"/>
+              </a:xfrm>
+              <a:prstGeom prst="rect">
+                <a:avLst/>
+              </a:prstGeom>
+              <a:blipFill>
+                <a:blip r:embed="rId8"/>
+                <a:stretch>
+                  <a:fillRect b="-12000"/>
+                </a:stretch>
+              </a:blipFill>
+            </p:spPr>
+            <p:txBody>
+              <a:bodyPr/>
+              <a:lstStyle/>
+              <a:p>
+                <a:r>
+                  <a:rPr lang="ko-KR" altLang="en-US">
+                    <a:noFill/>
+                  </a:rPr>
+                  <a:t> </a:t>
+                </a:r>
+              </a:p>
+            </p:txBody>
+          </p:sp>
+        </mc:Fallback>
+      </mc:AlternateContent>
+      <mc:AlternateContent xmlns:mc="http://schemas.openxmlformats.org/markup-compatibility/2006">
+        <mc:Choice xmlns:a14="http://schemas.microsoft.com/office/drawing/2010/main" Requires="a14">
+          <p:sp>
+            <p:nvSpPr>
+              <p:cNvPr id="18" name="직사각형 17"/>
+              <p:cNvSpPr/>
+              <p:nvPr/>
+            </p:nvSpPr>
+            <p:spPr>
+              <a:xfrm>
+                <a:off x="5907657" y="3346327"/>
+                <a:ext cx="504562" cy="307777"/>
+              </a:xfrm>
+              <a:prstGeom prst="rect">
+                <a:avLst/>
+              </a:prstGeom>
+              <a:noFill/>
+            </p:spPr>
+            <p:txBody>
+              <a:bodyPr wrap="none" lIns="91440" tIns="45720" rIns="91440" bIns="45720">
+                <a:spAutoFit/>
+              </a:bodyPr>
+              <a:lstStyle/>
+              <a:p>
+                <a:pPr algn="ctr"/>
+                <a14:m>
+                  <m:oMathPara xmlns:m="http://schemas.openxmlformats.org/officeDocument/2006/math">
+                    <m:oMathParaPr>
+                      <m:jc m:val="centerGroup"/>
+                    </m:oMathParaPr>
+                    <m:oMath xmlns:m="http://schemas.openxmlformats.org/officeDocument/2006/math">
+                      <m:r>
+                        <a:rPr lang="en-US" altLang="ko-KR" sz="1400" b="0" i="1" cap="none" spc="0" smtClean="0">
+                          <a:ln w="0"/>
+                          <a:solidFill>
+                            <a:schemeClr val="tx1"/>
+                          </a:solidFill>
+                          <a:effectLst/>
+                          <a:latin typeface="Cambria Math" panose="02040503050406030204" pitchFamily="18" charset="0"/>
+                        </a:rPr>
+                        <m:t>(</m:t>
+                      </m:r>
+                      <m:r>
+                        <a:rPr lang="en-US" altLang="ko-KR" sz="1400" b="0" i="1" cap="none" spc="0" smtClean="0">
+                          <a:ln w="0"/>
+                          <a:solidFill>
+                            <a:schemeClr val="tx1"/>
+                          </a:solidFill>
+                          <a:effectLst/>
+                          <a:latin typeface="Cambria Math" panose="02040503050406030204" pitchFamily="18" charset="0"/>
+                        </a:rPr>
+                        <m:t>𝑑</m:t>
+                      </m:r>
+                      <m:r>
+                        <a:rPr lang="en-US" altLang="ko-KR" sz="1400" b="0" i="1" cap="none" spc="0" smtClean="0">
+                          <a:ln w="0"/>
+                          <a:solidFill>
+                            <a:schemeClr val="tx1"/>
+                          </a:solidFill>
+                          <a:effectLst/>
+                          <a:latin typeface="Cambria Math" panose="02040503050406030204" pitchFamily="18" charset="0"/>
+                        </a:rPr>
+                        <m:t>)</m:t>
+                      </m:r>
+                    </m:oMath>
+                  </m:oMathPara>
+                </a14:m>
+                <a:endParaRPr lang="en-US" altLang="ko-KR" sz="1400" b="0" cap="none" spc="0">
+                  <a:ln w="0"/>
+                  <a:solidFill>
+                    <a:schemeClr val="tx1"/>
+                  </a:solidFill>
+                  <a:effectLst/>
+                </a:endParaRPr>
+              </a:p>
+            </p:txBody>
+          </p:sp>
+        </mc:Choice>
+        <mc:Fallback>
+          <p:sp>
+            <p:nvSpPr>
+              <p:cNvPr id="18" name="직사각형 17"/>
+              <p:cNvSpPr>
+                <a:spLocks noRot="1" noChangeAspect="1" noMove="1" noResize="1" noEditPoints="1" noAdjustHandles="1" noChangeArrowheads="1" noChangeShapeType="1" noTextEdit="1"/>
+              </p:cNvSpPr>
+              <p:nvPr/>
+            </p:nvSpPr>
+            <p:spPr>
+              <a:xfrm>
+                <a:off x="5907657" y="3346327"/>
+                <a:ext cx="504562" cy="307777"/>
+              </a:xfrm>
+              <a:prstGeom prst="rect">
+                <a:avLst/>
+              </a:prstGeom>
+              <a:blipFill>
+                <a:blip r:embed="rId9"/>
+                <a:stretch>
+                  <a:fillRect b="-12000"/>
+                </a:stretch>
+              </a:blipFill>
+            </p:spPr>
+            <p:txBody>
+              <a:bodyPr/>
+              <a:lstStyle/>
+              <a:p>
+                <a:r>
+                  <a:rPr lang="ko-KR" altLang="en-US">
+                    <a:noFill/>
+                  </a:rPr>
+                  <a:t> </a:t>
+                </a:r>
+              </a:p>
+            </p:txBody>
+          </p:sp>
+        </mc:Fallback>
+      </mc:AlternateContent>
+      <p:sp>
+        <p:nvSpPr>
+          <p:cNvPr id="9" name="직사각형 8"/>
+          <p:cNvSpPr/>
+          <p:nvPr/>
+        </p:nvSpPr>
+        <p:spPr>
+          <a:xfrm>
+            <a:off x="2910840" y="638558"/>
+            <a:ext cx="1066318" cy="200055"/>
+          </a:xfrm>
+          <a:prstGeom prst="rect">
+            <a:avLst/>
+          </a:prstGeom>
+          <a:noFill/>
+        </p:spPr>
+        <p:txBody>
+          <a:bodyPr wrap="none" lIns="91440" tIns="45720" rIns="91440" bIns="45720">
+            <a:spAutoFit/>
+          </a:bodyPr>
+          <a:lstStyle/>
+          <a:p>
+            <a:pPr algn="ctr"/>
+            <a:r>
+              <a:rPr lang="en-US" altLang="ko-KR" sz="700" smtClean="0">
+                <a:ln w="0"/>
+              </a:rPr>
+              <a:t>Republic of Korea - 1</a:t>
+            </a:r>
+            <a:endParaRPr lang="en-US" altLang="ko-KR" sz="700" b="0" cap="none" spc="0">
+              <a:ln w="0"/>
+              <a:solidFill>
+                <a:schemeClr val="tx1"/>
+              </a:solidFill>
+            </a:endParaRPr>
+          </a:p>
+        </p:txBody>
+      </p:sp>
+      <p:sp>
+        <p:nvSpPr>
+          <p:cNvPr id="20" name="직사각형 19"/>
+          <p:cNvSpPr/>
+          <p:nvPr/>
+        </p:nvSpPr>
+        <p:spPr>
+          <a:xfrm>
+            <a:off x="3161713" y="3246299"/>
+            <a:ext cx="564578" cy="200055"/>
+          </a:xfrm>
+          <a:prstGeom prst="rect">
+            <a:avLst/>
+          </a:prstGeom>
+          <a:noFill/>
+        </p:spPr>
+        <p:txBody>
+          <a:bodyPr wrap="none" lIns="91440" tIns="45720" rIns="91440" bIns="45720">
+            <a:spAutoFit/>
+          </a:bodyPr>
+          <a:lstStyle/>
+          <a:p>
+            <a:pPr algn="ctr"/>
+            <a:r>
+              <a:rPr lang="en-US" altLang="ko-KR" sz="700" smtClean="0">
+                <a:ln w="0"/>
+              </a:rPr>
+              <a:t>China - 1</a:t>
+            </a:r>
+            <a:endParaRPr lang="en-US" altLang="ko-KR" sz="700" b="0" cap="none" spc="0">
+              <a:ln w="0"/>
+              <a:solidFill>
+                <a:schemeClr val="tx1"/>
+              </a:solidFill>
+            </a:endParaRPr>
+          </a:p>
+        </p:txBody>
+      </p:sp>
+      <p:sp>
+        <p:nvSpPr>
+          <p:cNvPr id="21" name="직사각형 20"/>
+          <p:cNvSpPr/>
+          <p:nvPr/>
+        </p:nvSpPr>
+        <p:spPr>
+          <a:xfrm>
+            <a:off x="8569960" y="623345"/>
+            <a:ext cx="1066318" cy="200055"/>
+          </a:xfrm>
+          <a:prstGeom prst="rect">
+            <a:avLst/>
+          </a:prstGeom>
+          <a:noFill/>
+        </p:spPr>
+        <p:txBody>
+          <a:bodyPr wrap="none" lIns="91440" tIns="45720" rIns="91440" bIns="45720">
+            <a:spAutoFit/>
+          </a:bodyPr>
+          <a:lstStyle/>
+          <a:p>
+            <a:pPr algn="ctr"/>
+            <a:r>
+              <a:rPr lang="en-US" altLang="ko-KR" sz="700" smtClean="0">
+                <a:ln w="0"/>
+              </a:rPr>
+              <a:t>Republic of Korea - 2</a:t>
+            </a:r>
+            <a:endParaRPr lang="en-US" altLang="ko-KR" sz="700" b="0" cap="none" spc="0">
+              <a:ln w="0"/>
+              <a:solidFill>
+                <a:schemeClr val="tx1"/>
+              </a:solidFill>
+            </a:endParaRPr>
+          </a:p>
+        </p:txBody>
+      </p:sp>
+      <p:sp>
+        <p:nvSpPr>
+          <p:cNvPr id="22" name="직사각형 21"/>
+          <p:cNvSpPr/>
+          <p:nvPr/>
+        </p:nvSpPr>
+        <p:spPr>
+          <a:xfrm>
+            <a:off x="8815753" y="3226005"/>
+            <a:ext cx="564578" cy="200055"/>
+          </a:xfrm>
+          <a:prstGeom prst="rect">
+            <a:avLst/>
+          </a:prstGeom>
+          <a:noFill/>
+        </p:spPr>
+        <p:txBody>
+          <a:bodyPr wrap="none" lIns="91440" tIns="45720" rIns="91440" bIns="45720">
+            <a:spAutoFit/>
+          </a:bodyPr>
+          <a:lstStyle/>
+          <a:p>
+            <a:pPr algn="ctr"/>
+            <a:r>
+              <a:rPr lang="en-US" altLang="ko-KR" sz="700" smtClean="0">
+                <a:ln w="0"/>
+              </a:rPr>
+              <a:t>China - 2</a:t>
+            </a:r>
+            <a:endParaRPr lang="en-US" altLang="ko-KR" sz="700" b="0" cap="none" spc="0">
+              <a:ln w="0"/>
+              <a:solidFill>
+                <a:schemeClr val="tx1"/>
+              </a:solidFill>
+            </a:endParaRPr>
+          </a:p>
+        </p:txBody>
+      </p:sp>
+    </p:spTree>
+    <p:extLst>
+      <p:ext uri="{BB962C8B-B14F-4D97-AF65-F5344CB8AC3E}">
+        <p14:creationId xmlns:p14="http://schemas.microsoft.com/office/powerpoint/2010/main" val="2599647400"/>
       </p:ext>
     </p:extLst>
   </p:cSld>

</xml_diff>